<commit_message>
Änderung an der SVM-Slide der PPP
</commit_message>
<xml_diff>
--- a/Abschlusspräsentation-4.pptx
+++ b/Abschlusspräsentation-4.pptx
@@ -205,7 +205,7 @@
           <a:p>
             <a:fld id="{A57D27A1-214A-458A-A3B7-807F6FF442B2}" type="datetimeFigureOut">
               <a:rPr lang="de-DE" smtClean="0"/>
-              <a:t>09.06.20</a:t>
+              <a:t>09.06.2020</a:t>
             </a:fld>
             <a:endParaRPr lang="de-DE"/>
           </a:p>
@@ -1258,7 +1258,7 @@
           <a:p>
             <a:fld id="{B03AB384-284A-4429-AFB5-F1724AA94F76}" type="datetimeFigureOut">
               <a:rPr lang="de-DE" smtClean="0"/>
-              <a:t>09.06.20</a:t>
+              <a:t>09.06.2020</a:t>
             </a:fld>
             <a:endParaRPr lang="de-DE"/>
           </a:p>
@@ -1456,7 +1456,7 @@
           <a:p>
             <a:fld id="{B03AB384-284A-4429-AFB5-F1724AA94F76}" type="datetimeFigureOut">
               <a:rPr lang="de-DE" smtClean="0"/>
-              <a:t>09.06.20</a:t>
+              <a:t>09.06.2020</a:t>
             </a:fld>
             <a:endParaRPr lang="de-DE"/>
           </a:p>
@@ -1664,7 +1664,7 @@
           <a:p>
             <a:fld id="{B03AB384-284A-4429-AFB5-F1724AA94F76}" type="datetimeFigureOut">
               <a:rPr lang="de-DE" smtClean="0"/>
-              <a:t>09.06.20</a:t>
+              <a:t>09.06.2020</a:t>
             </a:fld>
             <a:endParaRPr lang="de-DE"/>
           </a:p>
@@ -1862,7 +1862,7 @@
           <a:p>
             <a:fld id="{B03AB384-284A-4429-AFB5-F1724AA94F76}" type="datetimeFigureOut">
               <a:rPr lang="de-DE" smtClean="0"/>
-              <a:t>09.06.20</a:t>
+              <a:t>09.06.2020</a:t>
             </a:fld>
             <a:endParaRPr lang="de-DE"/>
           </a:p>
@@ -2137,7 +2137,7 @@
           <a:p>
             <a:fld id="{B03AB384-284A-4429-AFB5-F1724AA94F76}" type="datetimeFigureOut">
               <a:rPr lang="de-DE" smtClean="0"/>
-              <a:t>09.06.20</a:t>
+              <a:t>09.06.2020</a:t>
             </a:fld>
             <a:endParaRPr lang="de-DE"/>
           </a:p>
@@ -2402,7 +2402,7 @@
           <a:p>
             <a:fld id="{B03AB384-284A-4429-AFB5-F1724AA94F76}" type="datetimeFigureOut">
               <a:rPr lang="de-DE" smtClean="0"/>
-              <a:t>09.06.20</a:t>
+              <a:t>09.06.2020</a:t>
             </a:fld>
             <a:endParaRPr lang="de-DE"/>
           </a:p>
@@ -2814,7 +2814,7 @@
           <a:p>
             <a:fld id="{B03AB384-284A-4429-AFB5-F1724AA94F76}" type="datetimeFigureOut">
               <a:rPr lang="de-DE" smtClean="0"/>
-              <a:t>09.06.20</a:t>
+              <a:t>09.06.2020</a:t>
             </a:fld>
             <a:endParaRPr lang="de-DE"/>
           </a:p>
@@ -2955,7 +2955,7 @@
           <a:p>
             <a:fld id="{B03AB384-284A-4429-AFB5-F1724AA94F76}" type="datetimeFigureOut">
               <a:rPr lang="de-DE" smtClean="0"/>
-              <a:t>09.06.20</a:t>
+              <a:t>09.06.2020</a:t>
             </a:fld>
             <a:endParaRPr lang="de-DE"/>
           </a:p>
@@ -3068,7 +3068,7 @@
           <a:p>
             <a:fld id="{B03AB384-284A-4429-AFB5-F1724AA94F76}" type="datetimeFigureOut">
               <a:rPr lang="de-DE" smtClean="0"/>
-              <a:t>09.06.20</a:t>
+              <a:t>09.06.2020</a:t>
             </a:fld>
             <a:endParaRPr lang="de-DE"/>
           </a:p>
@@ -3379,7 +3379,7 @@
           <a:p>
             <a:fld id="{B03AB384-284A-4429-AFB5-F1724AA94F76}" type="datetimeFigureOut">
               <a:rPr lang="de-DE" smtClean="0"/>
-              <a:t>09.06.20</a:t>
+              <a:t>09.06.2020</a:t>
             </a:fld>
             <a:endParaRPr lang="de-DE"/>
           </a:p>
@@ -3667,7 +3667,7 @@
           <a:p>
             <a:fld id="{B03AB384-284A-4429-AFB5-F1724AA94F76}" type="datetimeFigureOut">
               <a:rPr lang="de-DE" smtClean="0"/>
-              <a:t>09.06.20</a:t>
+              <a:t>09.06.2020</a:t>
             </a:fld>
             <a:endParaRPr lang="de-DE"/>
           </a:p>
@@ -3908,7 +3908,7 @@
           <a:p>
             <a:fld id="{B03AB384-284A-4429-AFB5-F1724AA94F76}" type="datetimeFigureOut">
               <a:rPr lang="de-DE" smtClean="0"/>
-              <a:t>09.06.20</a:t>
+              <a:t>09.06.2020</a:t>
             </a:fld>
             <a:endParaRPr lang="de-DE"/>
           </a:p>
@@ -6313,7 +6313,7 @@
           <p:nvPr>
             <p:extLst>
               <p:ext uri="{D42A27DB-BD31-4B8C-83A1-F6EECF244321}">
-                <p14:modId xmlns:p14="http://schemas.microsoft.com/office/powerpoint/2010/main" val="906485579"/>
+                <p14:modId xmlns:p14="http://schemas.microsoft.com/office/powerpoint/2010/main" val="437040361"/>
               </p:ext>
             </p:extLst>
           </p:nvPr>
@@ -6377,7 +6377,7 @@
                     <a:p>
                       <a:pPr algn="ctr"/>
                       <a:r>
-                        <a:rPr lang="de-DE" sz="2000" dirty="0"/>
+                        <a:rPr lang="de-DE" sz="2000" b="1" dirty="0"/>
                         <a:t>Training-MAPE</a:t>
                       </a:r>
                     </a:p>
@@ -6391,11 +6391,11 @@
                     <a:p>
                       <a:pPr algn="ctr"/>
                       <a:r>
-                        <a:rPr lang="de-DE" sz="2000" dirty="0" err="1"/>
+                        <a:rPr lang="de-DE" sz="2000" b="1" dirty="0" err="1"/>
                         <a:t>Testing</a:t>
                       </a:r>
                       <a:r>
-                        <a:rPr lang="de-DE" sz="2000" dirty="0"/>
+                        <a:rPr lang="de-DE" sz="2000" b="1" dirty="0"/>
                         <a:t>-MAPE</a:t>
                       </a:r>
                     </a:p>
@@ -6444,10 +6444,14 @@
                     <a:p>
                       <a:pPr algn="ctr"/>
                       <a:r>
+                        <a:rPr lang="de-DE" sz="2000" b="1" dirty="0"/>
+                        <a:t>0.2025104 </a:t>
+                      </a:r>
+                      <a:r>
                         <a:rPr lang="de-DE" sz="2000" b="1" dirty="0">
                           <a:effectLst/>
                         </a:rPr>
-                        <a:t>0.2026221 </a:t>
+                        <a:t> </a:t>
                       </a:r>
                       <a:r>
                         <a:rPr lang="de-DE" sz="2000" b="1" dirty="0"/>
@@ -6464,12 +6468,9 @@
                     <a:p>
                       <a:pPr algn="ctr"/>
                       <a:r>
-                        <a:rPr lang="de-DE" sz="2000" b="1" dirty="0">
-                          <a:effectLst/>
-                        </a:rPr>
-                        <a:t>0.2077283</a:t>
+                        <a:rPr lang="de-DE" sz="2000" b="1" dirty="0"/>
+                        <a:t>0.2188214</a:t>
                       </a:r>
-                      <a:endParaRPr lang="de-DE" sz="2000" b="1" dirty="0"/>
                     </a:p>
                   </a:txBody>
                   <a:tcPr/>
@@ -6519,14 +6520,8 @@
                     <a:p>
                       <a:pPr algn="ctr"/>
                       <a:r>
-                        <a:rPr lang="de-DE" sz="2000" b="1" dirty="0">
-                          <a:effectLst/>
-                        </a:rPr>
-                        <a:t>0.1331242 </a:t>
-                      </a:r>
-                      <a:r>
                         <a:rPr lang="de-DE" sz="2000" b="1" dirty="0"/>
-                        <a:t> </a:t>
+                        <a:t>0.1298205 </a:t>
                       </a:r>
                     </a:p>
                   </a:txBody>
@@ -6539,12 +6534,9 @@
                     <a:p>
                       <a:pPr algn="ctr"/>
                       <a:r>
-                        <a:rPr lang="de-DE" sz="2000" b="1" dirty="0">
-                          <a:effectLst/>
-                        </a:rPr>
-                        <a:t>0.1399899</a:t>
+                        <a:rPr lang="de-DE" sz="2000" b="1" dirty="0"/>
+                        <a:t>0.1378727</a:t>
                       </a:r>
-                      <a:endParaRPr lang="de-DE" sz="2000" b="1" dirty="0"/>
                     </a:p>
                   </a:txBody>
                   <a:tcPr/>
@@ -6594,10 +6586,14 @@
                     <a:p>
                       <a:pPr algn="ctr"/>
                       <a:r>
+                        <a:rPr lang="de-DE" sz="2000" b="1" dirty="0"/>
+                        <a:t>0.1712652 </a:t>
+                      </a:r>
+                      <a:r>
                         <a:rPr lang="de-DE" sz="2000" b="1" dirty="0">
                           <a:effectLst/>
                         </a:rPr>
-                        <a:t>0.1731559 </a:t>
+                        <a:t> </a:t>
                       </a:r>
                       <a:r>
                         <a:rPr lang="de-DE" sz="2000" b="1" dirty="0"/>
@@ -6614,12 +6610,9 @@
                     <a:p>
                       <a:pPr algn="ctr"/>
                       <a:r>
-                        <a:rPr lang="de-DE" sz="2000" b="1" dirty="0">
-                          <a:effectLst/>
-                        </a:rPr>
-                        <a:t>0.2112044</a:t>
+                        <a:rPr lang="de-DE" sz="2000" b="1" dirty="0"/>
+                        <a:t>0.2085662</a:t>
                       </a:r>
-                      <a:endParaRPr lang="de-DE" sz="2000" b="1" dirty="0"/>
                     </a:p>
                   </a:txBody>
                   <a:tcPr/>
@@ -6669,12 +6662,9 @@
                     <a:p>
                       <a:pPr algn="ctr"/>
                       <a:r>
-                        <a:rPr lang="de-DE" sz="2000" b="1" dirty="0">
-                          <a:effectLst/>
-                        </a:rPr>
-                        <a:t>0.2246668 </a:t>
+                        <a:rPr lang="de-DE" sz="2000" b="1" dirty="0"/>
+                        <a:t>0.2235303 </a:t>
                       </a:r>
-                      <a:endParaRPr lang="de-DE" sz="2000" b="1" dirty="0"/>
                     </a:p>
                   </a:txBody>
                   <a:tcPr/>
@@ -6686,12 +6676,9 @@
                     <a:p>
                       <a:pPr algn="ctr"/>
                       <a:r>
-                        <a:rPr lang="de-DE" sz="2000" b="1" dirty="0">
-                          <a:effectLst/>
-                        </a:rPr>
-                        <a:t>0.2475453</a:t>
+                        <a:rPr lang="de-DE" sz="2000" b="1" dirty="0"/>
+                        <a:t>0.2450586</a:t>
                       </a:r>
-                      <a:endParaRPr lang="de-DE" sz="2000" b="1" dirty="0"/>
                     </a:p>
                   </a:txBody>
                   <a:tcPr/>
@@ -6741,14 +6728,8 @@
                     <a:p>
                       <a:pPr algn="ctr"/>
                       <a:r>
-                        <a:rPr lang="de-DE" sz="2000" b="1" dirty="0">
-                          <a:effectLst/>
-                        </a:rPr>
-                        <a:t>0.1426946 </a:t>
-                      </a:r>
-                      <a:r>
                         <a:rPr lang="de-DE" sz="2000" b="1" dirty="0"/>
-                        <a:t> </a:t>
+                        <a:t>0.1358742 </a:t>
                       </a:r>
                     </a:p>
                   </a:txBody>
@@ -6761,12 +6742,9 @@
                     <a:p>
                       <a:pPr algn="ctr"/>
                       <a:r>
-                        <a:rPr lang="de-DE" sz="2000" b="1" dirty="0">
-                          <a:effectLst/>
-                        </a:rPr>
-                        <a:t>0.1786739</a:t>
+                        <a:rPr lang="de-DE" sz="2000" b="1" dirty="0"/>
+                        <a:t>0.1715157</a:t>
                       </a:r>
-                      <a:endParaRPr lang="de-DE" sz="2000" b="1" dirty="0"/>
                     </a:p>
                   </a:txBody>
                   <a:tcPr/>
@@ -6816,12 +6794,9 @@
                     <a:p>
                       <a:pPr algn="ctr"/>
                       <a:r>
-                        <a:rPr lang="de-DE" sz="2000" b="1" dirty="0">
-                          <a:effectLst/>
-                        </a:rPr>
-                        <a:t>0.9201665 </a:t>
+                        <a:rPr lang="de-DE" sz="2000" b="1" dirty="0"/>
+                        <a:t>0.9120678 </a:t>
                       </a:r>
-                      <a:endParaRPr lang="de-DE" sz="2000" b="1" dirty="0"/>
                     </a:p>
                   </a:txBody>
                   <a:tcPr/>
@@ -6833,12 +6808,9 @@
                     <a:p>
                       <a:pPr algn="ctr"/>
                       <a:r>
-                        <a:rPr lang="de-DE" sz="2000" b="1" dirty="0">
-                          <a:effectLst/>
-                        </a:rPr>
-                        <a:t>0.9191404</a:t>
+                        <a:rPr lang="de-DE" sz="2000" b="1" dirty="0"/>
+                        <a:t>0.9213993</a:t>
                       </a:r>
-                      <a:endParaRPr lang="de-DE" sz="2000" b="1" dirty="0"/>
                     </a:p>
                   </a:txBody>
                   <a:tcPr/>

</xml_diff>